<commit_message>
Add database for CX
</commit_message>
<xml_diff>
--- a/images/draw.pptx
+++ b/images/draw.pptx
@@ -15134,7 +15134,7 @@
         <p:spPr>
           <a:xfrm>
             <a:off x="3197828" y="2402682"/>
-            <a:ext cx="309753" cy="831212"/>
+            <a:ext cx="309753" cy="1109238"/>
           </a:xfrm>
           <a:prstGeom prst="roundRect">
             <a:avLst/>
@@ -15169,7 +15169,7 @@
           <a:lstStyle/>
           <a:p>
             <a:pPr algn="ctr"/>
-            <a:endParaRPr lang="en-US"/>
+            <a:endParaRPr lang="en-US" dirty="0"/>
           </a:p>
         </p:txBody>
       </p:sp>
@@ -15241,8 +15241,8 @@
         </p:nvSpPr>
         <p:spPr>
           <a:xfrm>
-            <a:off x="3563664" y="2680708"/>
-            <a:ext cx="236811" cy="553179"/>
+            <a:off x="3563664" y="2400839"/>
+            <a:ext cx="236811" cy="1111081"/>
           </a:xfrm>
           <a:prstGeom prst="roundRect">
             <a:avLst/>
@@ -15297,8 +15297,8 @@
             </p:nvSpPr>
             <p:spPr>
               <a:xfrm>
-                <a:off x="2075984" y="3565193"/>
-                <a:ext cx="304827" cy="276999"/>
+                <a:off x="1627957" y="3565193"/>
+                <a:ext cx="1162868" cy="276999"/>
               </a:xfrm>
               <a:prstGeom prst="rect">
                 <a:avLst/>
@@ -15306,7 +15306,7 @@
               <a:noFill/>
             </p:spPr>
             <p:txBody>
-              <a:bodyPr wrap="none" lIns="0" tIns="0" rIns="0" bIns="0" rtlCol="0">
+              <a:bodyPr wrap="square" lIns="0" tIns="0" rIns="0" bIns="0" rtlCol="0">
                 <a:spAutoFit/>
               </a:bodyPr>
               <a:lstStyle/>
@@ -15367,8 +15367,8 @@
             </p:nvSpPr>
             <p:spPr>
               <a:xfrm>
-                <a:off x="2075984" y="3565193"/>
-                <a:ext cx="304827" cy="276999"/>
+                <a:off x="1627957" y="3565193"/>
+                <a:ext cx="1162868" cy="276999"/>
               </a:xfrm>
               <a:prstGeom prst="rect">
                 <a:avLst/>
@@ -15376,7 +15376,7 @@
               <a:blipFill>
                 <a:blip r:embed="rId5"/>
                 <a:stretch>
-                  <a:fillRect l="-18000" r="-8000" b="-15556"/>
+                  <a:fillRect b="-15556"/>
                 </a:stretch>
               </a:blipFill>
             </p:spPr>
@@ -15411,8 +15411,8 @@
             </p:nvSpPr>
             <p:spPr>
               <a:xfrm>
-                <a:off x="2837659" y="3565193"/>
-                <a:ext cx="273858" cy="276999"/>
+                <a:off x="2837658" y="3565193"/>
+                <a:ext cx="309753" cy="276999"/>
               </a:xfrm>
               <a:prstGeom prst="rect">
                 <a:avLst/>
@@ -15420,7 +15420,7 @@
               <a:noFill/>
             </p:spPr>
             <p:txBody>
-              <a:bodyPr wrap="none" lIns="0" tIns="0" rIns="0" bIns="0" rtlCol="0">
+              <a:bodyPr wrap="square" lIns="0" tIns="0" rIns="0" bIns="0" rtlCol="0">
                 <a:spAutoFit/>
               </a:bodyPr>
               <a:lstStyle/>
@@ -15481,8 +15481,8 @@
             </p:nvSpPr>
             <p:spPr>
               <a:xfrm>
-                <a:off x="2837659" y="3565193"/>
-                <a:ext cx="273858" cy="276999"/>
+                <a:off x="2837658" y="3565193"/>
+                <a:ext cx="309753" cy="276999"/>
               </a:xfrm>
               <a:prstGeom prst="rect">
                 <a:avLst/>
@@ -15490,7 +15490,7 @@
               <a:blipFill>
                 <a:blip r:embed="rId6"/>
                 <a:stretch>
-                  <a:fillRect l="-20000" r="-8889" b="-15556"/>
+                  <a:fillRect l="-11765" r="-1961" b="-15556"/>
                 </a:stretch>
               </a:blipFill>
             </p:spPr>
@@ -15525,8 +15525,8 @@
             </p:nvSpPr>
             <p:spPr>
               <a:xfrm>
-                <a:off x="3548880" y="3565193"/>
-                <a:ext cx="268535" cy="276999"/>
+                <a:off x="3563664" y="3565193"/>
+                <a:ext cx="236811" cy="276999"/>
               </a:xfrm>
               <a:prstGeom prst="rect">
                 <a:avLst/>
@@ -15534,7 +15534,7 @@
               <a:noFill/>
             </p:spPr>
             <p:txBody>
-              <a:bodyPr wrap="none" lIns="0" tIns="0" rIns="0" bIns="0" rtlCol="0">
+              <a:bodyPr wrap="square" lIns="0" tIns="0" rIns="0" bIns="0" rtlCol="0">
                 <a:spAutoFit/>
               </a:bodyPr>
               <a:lstStyle/>
@@ -15595,8 +15595,8 @@
             </p:nvSpPr>
             <p:spPr>
               <a:xfrm>
-                <a:off x="3548880" y="3565193"/>
-                <a:ext cx="268535" cy="276999"/>
+                <a:off x="3563664" y="3565193"/>
+                <a:ext cx="236811" cy="276999"/>
               </a:xfrm>
               <a:prstGeom prst="rect">
                 <a:avLst/>
@@ -15604,7 +15604,7 @@
               <a:blipFill>
                 <a:blip r:embed="rId7"/>
                 <a:stretch>
-                  <a:fillRect l="-20455" r="-9091" b="-15556"/>
+                  <a:fillRect l="-31579" r="-18421" b="-15556"/>
                 </a:stretch>
               </a:blipFill>
             </p:spPr>
@@ -15639,8 +15639,8 @@
             </p:nvSpPr>
             <p:spPr>
               <a:xfrm>
-                <a:off x="3208076" y="3565192"/>
-                <a:ext cx="299505" cy="276999"/>
+                <a:off x="3192294" y="3565192"/>
+                <a:ext cx="309753" cy="276999"/>
               </a:xfrm>
               <a:prstGeom prst="rect">
                 <a:avLst/>
@@ -15648,7 +15648,7 @@
               <a:noFill/>
             </p:spPr>
             <p:txBody>
-              <a:bodyPr wrap="none" lIns="0" tIns="0" rIns="0" bIns="0" rtlCol="0">
+              <a:bodyPr wrap="square" lIns="0" tIns="0" rIns="0" bIns="0" rtlCol="0">
                 <a:spAutoFit/>
               </a:bodyPr>
               <a:lstStyle/>
@@ -15709,8 +15709,8 @@
             </p:nvSpPr>
             <p:spPr>
               <a:xfrm>
-                <a:off x="3208076" y="3565192"/>
-                <a:ext cx="299505" cy="276999"/>
+                <a:off x="3192294" y="3565192"/>
+                <a:ext cx="309753" cy="276999"/>
               </a:xfrm>
               <a:prstGeom prst="rect">
                 <a:avLst/>
@@ -15718,7 +15718,7 @@
               <a:blipFill>
                 <a:blip r:embed="rId8"/>
                 <a:stretch>
-                  <a:fillRect l="-18367" r="-8163" b="-15556"/>
+                  <a:fillRect l="-18000" r="-6000" b="-15556"/>
                 </a:stretch>
               </a:blipFill>
             </p:spPr>
@@ -15737,6 +15737,1595 @@
           </p:sp>
         </mc:Fallback>
       </mc:AlternateContent>
+      <p:grpSp>
+        <p:nvGrpSpPr>
+          <p:cNvPr id="51" name="Group 50">
+            <a:extLst>
+              <a:ext uri="{FF2B5EF4-FFF2-40B4-BE49-F238E27FC236}">
+                <a16:creationId xmlns:a16="http://schemas.microsoft.com/office/drawing/2014/main" id="{17A78747-2FC8-0408-4A05-9FC1C9B9A0E2}"/>
+              </a:ext>
+            </a:extLst>
+          </p:cNvPr>
+          <p:cNvGrpSpPr/>
+          <p:nvPr/>
+        </p:nvGrpSpPr>
+        <p:grpSpPr>
+          <a:xfrm>
+            <a:off x="5004003" y="2785763"/>
+            <a:ext cx="681037" cy="424337"/>
+            <a:chOff x="2438400" y="2562225"/>
+            <a:chExt cx="681037" cy="424337"/>
+          </a:xfrm>
+        </p:grpSpPr>
+        <p:cxnSp>
+          <p:nvCxnSpPr>
+            <p:cNvPr id="52" name="Straight Connector 51">
+              <a:extLst>
+                <a:ext uri="{FF2B5EF4-FFF2-40B4-BE49-F238E27FC236}">
+                  <a16:creationId xmlns:a16="http://schemas.microsoft.com/office/drawing/2014/main" id="{241334C3-30DD-3F70-44A4-49356B95D8CF}"/>
+                </a:ext>
+              </a:extLst>
+            </p:cNvPr>
+            <p:cNvCxnSpPr/>
+            <p:nvPr/>
+          </p:nvCxnSpPr>
+          <p:spPr>
+            <a:xfrm>
+              <a:off x="2778919" y="2562225"/>
+              <a:ext cx="0" cy="269081"/>
+            </a:xfrm>
+            <a:prstGeom prst="line">
+              <a:avLst/>
+            </a:prstGeom>
+            <a:ln w="28575"/>
+          </p:spPr>
+          <p:style>
+            <a:lnRef idx="1">
+              <a:schemeClr val="dk1"/>
+            </a:lnRef>
+            <a:fillRef idx="0">
+              <a:schemeClr val="dk1"/>
+            </a:fillRef>
+            <a:effectRef idx="0">
+              <a:schemeClr val="dk1"/>
+            </a:effectRef>
+            <a:fontRef idx="minor">
+              <a:schemeClr val="tx1"/>
+            </a:fontRef>
+          </p:style>
+        </p:cxnSp>
+        <mc:AlternateContent xmlns:mc="http://schemas.openxmlformats.org/markup-compatibility/2006">
+          <mc:Choice xmlns:a14="http://schemas.microsoft.com/office/drawing/2010/main" Requires="a14">
+            <p:sp>
+              <p:nvSpPr>
+                <p:cNvPr id="53" name="TextBox 52">
+                  <a:extLst>
+                    <a:ext uri="{FF2B5EF4-FFF2-40B4-BE49-F238E27FC236}">
+                      <a16:creationId xmlns:a16="http://schemas.microsoft.com/office/drawing/2014/main" id="{346E9D27-421C-8E53-6C76-51C4D150D8D0}"/>
+                    </a:ext>
+                  </a:extLst>
+                </p:cNvPr>
+                <p:cNvSpPr txBox="1"/>
+                <p:nvPr/>
+              </p:nvSpPr>
+              <p:spPr>
+                <a:xfrm>
+                  <a:off x="2438400" y="2617230"/>
+                  <a:ext cx="681037" cy="369332"/>
+                </a:xfrm>
+                <a:prstGeom prst="rect">
+                  <a:avLst/>
+                </a:prstGeom>
+                <a:noFill/>
+              </p:spPr>
+              <p:txBody>
+                <a:bodyPr wrap="square" rtlCol="0">
+                  <a:spAutoFit/>
+                </a:bodyPr>
+                <a:lstStyle/>
+                <a:p>
+                  <a14:m>
+                    <m:oMathPara xmlns:m="http://schemas.openxmlformats.org/officeDocument/2006/math">
+                      <m:oMathParaPr>
+                        <m:jc m:val="centerGroup"/>
+                      </m:oMathParaPr>
+                      <m:oMath xmlns:m="http://schemas.openxmlformats.org/officeDocument/2006/math">
+                        <m:r>
+                          <a:rPr lang="en-US" b="0" i="1" smtClean="0">
+                            <a:latin typeface="Cambria Math" panose="02040503050406030204" pitchFamily="18" charset="0"/>
+                          </a:rPr>
+                          <m:t>×</m:t>
+                        </m:r>
+                      </m:oMath>
+                    </m:oMathPara>
+                  </a14:m>
+                  <a:endParaRPr lang="en-US" dirty="0"/>
+                </a:p>
+              </p:txBody>
+            </p:sp>
+          </mc:Choice>
+          <mc:Fallback>
+            <p:sp>
+              <p:nvSpPr>
+                <p:cNvPr id="53" name="TextBox 52">
+                  <a:extLst>
+                    <a:ext uri="{FF2B5EF4-FFF2-40B4-BE49-F238E27FC236}">
+                      <a16:creationId xmlns:a16="http://schemas.microsoft.com/office/drawing/2014/main" id="{346E9D27-421C-8E53-6C76-51C4D150D8D0}"/>
+                    </a:ext>
+                  </a:extLst>
+                </p:cNvPr>
+                <p:cNvSpPr txBox="1">
+                  <a:spLocks noRot="1" noChangeAspect="1" noMove="1" noResize="1" noEditPoints="1" noAdjustHandles="1" noChangeArrowheads="1" noChangeShapeType="1" noTextEdit="1"/>
+                </p:cNvSpPr>
+                <p:nvPr/>
+              </p:nvSpPr>
+              <p:spPr>
+                <a:xfrm>
+                  <a:off x="2438400" y="2617230"/>
+                  <a:ext cx="681037" cy="369332"/>
+                </a:xfrm>
+                <a:prstGeom prst="rect">
+                  <a:avLst/>
+                </a:prstGeom>
+                <a:blipFill>
+                  <a:blip r:embed="rId9"/>
+                  <a:stretch>
+                    <a:fillRect/>
+                  </a:stretch>
+                </a:blipFill>
+              </p:spPr>
+              <p:txBody>
+                <a:bodyPr/>
+                <a:lstStyle/>
+                <a:p>
+                  <a:r>
+                    <a:rPr lang="en-US">
+                      <a:noFill/>
+                    </a:rPr>
+                    <a:t> </a:t>
+                  </a:r>
+                </a:p>
+              </p:txBody>
+            </p:sp>
+          </mc:Fallback>
+        </mc:AlternateContent>
+      </p:grpSp>
+      <mc:AlternateContent xmlns:mc="http://schemas.openxmlformats.org/markup-compatibility/2006">
+        <mc:Choice xmlns:a14="http://schemas.microsoft.com/office/drawing/2010/main" Requires="a14">
+          <p:sp>
+            <p:nvSpPr>
+              <p:cNvPr id="54" name="TextBox 53">
+                <a:extLst>
+                  <a:ext uri="{FF2B5EF4-FFF2-40B4-BE49-F238E27FC236}">
+                    <a16:creationId xmlns:a16="http://schemas.microsoft.com/office/drawing/2014/main" id="{819A02C6-FDA3-98F8-6F26-D0B8904C1BB5}"/>
+                  </a:ext>
+                </a:extLst>
+              </p:cNvPr>
+              <p:cNvSpPr txBox="1"/>
+              <p:nvPr/>
+            </p:nvSpPr>
+            <p:spPr>
+              <a:xfrm>
+                <a:off x="1328013" y="2407052"/>
+                <a:ext cx="181140" cy="276999"/>
+              </a:xfrm>
+              <a:prstGeom prst="rect">
+                <a:avLst/>
+              </a:prstGeom>
+              <a:noFill/>
+            </p:spPr>
+            <p:txBody>
+              <a:bodyPr wrap="none" lIns="0" tIns="0" rIns="0" bIns="0" rtlCol="0">
+                <a:spAutoFit/>
+              </a:bodyPr>
+              <a:lstStyle/>
+              <a:p>
+                <a14:m>
+                  <m:oMathPara xmlns:m="http://schemas.openxmlformats.org/officeDocument/2006/math">
+                    <m:oMathParaPr>
+                      <m:jc m:val="centerGroup"/>
+                    </m:oMathParaPr>
+                    <m:oMath xmlns:m="http://schemas.openxmlformats.org/officeDocument/2006/math">
+                      <m:r>
+                        <a:rPr lang="en-US" b="0" i="1" smtClean="0">
+                          <a:latin typeface="Cambria Math" panose="02040503050406030204" pitchFamily="18" charset="0"/>
+                        </a:rPr>
+                        <m:t>0</m:t>
+                      </m:r>
+                    </m:oMath>
+                  </m:oMathPara>
+                </a14:m>
+                <a:endParaRPr lang="en-US" dirty="0"/>
+              </a:p>
+            </p:txBody>
+          </p:sp>
+        </mc:Choice>
+        <mc:Fallback>
+          <p:sp>
+            <p:nvSpPr>
+              <p:cNvPr id="54" name="TextBox 53">
+                <a:extLst>
+                  <a:ext uri="{FF2B5EF4-FFF2-40B4-BE49-F238E27FC236}">
+                    <a16:creationId xmlns:a16="http://schemas.microsoft.com/office/drawing/2014/main" id="{819A02C6-FDA3-98F8-6F26-D0B8904C1BB5}"/>
+                  </a:ext>
+                </a:extLst>
+              </p:cNvPr>
+              <p:cNvSpPr txBox="1">
+                <a:spLocks noRot="1" noChangeAspect="1" noMove="1" noResize="1" noEditPoints="1" noAdjustHandles="1" noChangeArrowheads="1" noChangeShapeType="1" noTextEdit="1"/>
+              </p:cNvSpPr>
+              <p:nvPr/>
+            </p:nvSpPr>
+            <p:spPr>
+              <a:xfrm>
+                <a:off x="1328013" y="2407052"/>
+                <a:ext cx="181140" cy="276999"/>
+              </a:xfrm>
+              <a:prstGeom prst="rect">
+                <a:avLst/>
+              </a:prstGeom>
+              <a:blipFill>
+                <a:blip r:embed="rId10"/>
+                <a:stretch>
+                  <a:fillRect l="-33333" r="-26667" b="-6667"/>
+                </a:stretch>
+              </a:blipFill>
+            </p:spPr>
+            <p:txBody>
+              <a:bodyPr/>
+              <a:lstStyle/>
+              <a:p>
+                <a:r>
+                  <a:rPr lang="en-US">
+                    <a:noFill/>
+                  </a:rPr>
+                  <a:t> </a:t>
+                </a:r>
+              </a:p>
+            </p:txBody>
+          </p:sp>
+        </mc:Fallback>
+      </mc:AlternateContent>
+      <mc:AlternateContent xmlns:mc="http://schemas.openxmlformats.org/markup-compatibility/2006">
+        <mc:Choice xmlns:a14="http://schemas.microsoft.com/office/drawing/2010/main" Requires="a14">
+          <p:sp>
+            <p:nvSpPr>
+              <p:cNvPr id="55" name="TextBox 54">
+                <a:extLst>
+                  <a:ext uri="{FF2B5EF4-FFF2-40B4-BE49-F238E27FC236}">
+                    <a16:creationId xmlns:a16="http://schemas.microsoft.com/office/drawing/2014/main" id="{17A921D6-BC67-3BF6-EAB5-3D80C1B175EE}"/>
+                  </a:ext>
+                </a:extLst>
+              </p:cNvPr>
+              <p:cNvSpPr txBox="1"/>
+              <p:nvPr/>
+            </p:nvSpPr>
+            <p:spPr>
+              <a:xfrm>
+                <a:off x="1325493" y="2666823"/>
+                <a:ext cx="181140" cy="276999"/>
+              </a:xfrm>
+              <a:prstGeom prst="rect">
+                <a:avLst/>
+              </a:prstGeom>
+              <a:noFill/>
+            </p:spPr>
+            <p:txBody>
+              <a:bodyPr wrap="none" lIns="0" tIns="0" rIns="0" bIns="0" rtlCol="0">
+                <a:spAutoFit/>
+              </a:bodyPr>
+              <a:lstStyle/>
+              <a:p>
+                <a14:m>
+                  <m:oMathPara xmlns:m="http://schemas.openxmlformats.org/officeDocument/2006/math">
+                    <m:oMathParaPr>
+                      <m:jc m:val="centerGroup"/>
+                    </m:oMathParaPr>
+                    <m:oMath xmlns:m="http://schemas.openxmlformats.org/officeDocument/2006/math">
+                      <m:r>
+                        <a:rPr lang="en-US" b="0" i="1" smtClean="0">
+                          <a:latin typeface="Cambria Math" panose="02040503050406030204" pitchFamily="18" charset="0"/>
+                        </a:rPr>
+                        <m:t>1</m:t>
+                      </m:r>
+                    </m:oMath>
+                  </m:oMathPara>
+                </a14:m>
+                <a:endParaRPr lang="en-US" dirty="0"/>
+              </a:p>
+            </p:txBody>
+          </p:sp>
+        </mc:Choice>
+        <mc:Fallback>
+          <p:sp>
+            <p:nvSpPr>
+              <p:cNvPr id="55" name="TextBox 54">
+                <a:extLst>
+                  <a:ext uri="{FF2B5EF4-FFF2-40B4-BE49-F238E27FC236}">
+                    <a16:creationId xmlns:a16="http://schemas.microsoft.com/office/drawing/2014/main" id="{17A921D6-BC67-3BF6-EAB5-3D80C1B175EE}"/>
+                  </a:ext>
+                </a:extLst>
+              </p:cNvPr>
+              <p:cNvSpPr txBox="1">
+                <a:spLocks noRot="1" noChangeAspect="1" noMove="1" noResize="1" noEditPoints="1" noAdjustHandles="1" noChangeArrowheads="1" noChangeShapeType="1" noTextEdit="1"/>
+              </p:cNvSpPr>
+              <p:nvPr/>
+            </p:nvSpPr>
+            <p:spPr>
+              <a:xfrm>
+                <a:off x="1325493" y="2666823"/>
+                <a:ext cx="181140" cy="276999"/>
+              </a:xfrm>
+              <a:prstGeom prst="rect">
+                <a:avLst/>
+              </a:prstGeom>
+              <a:blipFill>
+                <a:blip r:embed="rId11"/>
+                <a:stretch>
+                  <a:fillRect l="-30000" r="-30000" b="-6522"/>
+                </a:stretch>
+              </a:blipFill>
+            </p:spPr>
+            <p:txBody>
+              <a:bodyPr/>
+              <a:lstStyle/>
+              <a:p>
+                <a:r>
+                  <a:rPr lang="en-US">
+                    <a:noFill/>
+                  </a:rPr>
+                  <a:t> </a:t>
+                </a:r>
+              </a:p>
+            </p:txBody>
+          </p:sp>
+        </mc:Fallback>
+      </mc:AlternateContent>
+      <mc:AlternateContent xmlns:mc="http://schemas.openxmlformats.org/markup-compatibility/2006">
+        <mc:Choice xmlns:a14="http://schemas.microsoft.com/office/drawing/2010/main" Requires="a14">
+          <p:sp>
+            <p:nvSpPr>
+              <p:cNvPr id="56" name="TextBox 55">
+                <a:extLst>
+                  <a:ext uri="{FF2B5EF4-FFF2-40B4-BE49-F238E27FC236}">
+                    <a16:creationId xmlns:a16="http://schemas.microsoft.com/office/drawing/2014/main" id="{2E6694B3-01C0-7410-1D19-E1DD3AE0BBDD}"/>
+                  </a:ext>
+                </a:extLst>
+              </p:cNvPr>
+              <p:cNvSpPr txBox="1"/>
+              <p:nvPr/>
+            </p:nvSpPr>
+            <p:spPr>
+              <a:xfrm>
+                <a:off x="1330229" y="2926594"/>
+                <a:ext cx="181140" cy="276999"/>
+              </a:xfrm>
+              <a:prstGeom prst="rect">
+                <a:avLst/>
+              </a:prstGeom>
+              <a:noFill/>
+            </p:spPr>
+            <p:txBody>
+              <a:bodyPr wrap="none" lIns="0" tIns="0" rIns="0" bIns="0" rtlCol="0">
+                <a:spAutoFit/>
+              </a:bodyPr>
+              <a:lstStyle/>
+              <a:p>
+                <a14:m>
+                  <m:oMathPara xmlns:m="http://schemas.openxmlformats.org/officeDocument/2006/math">
+                    <m:oMathParaPr>
+                      <m:jc m:val="centerGroup"/>
+                    </m:oMathParaPr>
+                    <m:oMath xmlns:m="http://schemas.openxmlformats.org/officeDocument/2006/math">
+                      <m:r>
+                        <a:rPr lang="en-US" b="0" i="1" smtClean="0">
+                          <a:latin typeface="Cambria Math" panose="02040503050406030204" pitchFamily="18" charset="0"/>
+                        </a:rPr>
+                        <m:t>2</m:t>
+                      </m:r>
+                    </m:oMath>
+                  </m:oMathPara>
+                </a14:m>
+                <a:endParaRPr lang="en-US" dirty="0"/>
+              </a:p>
+            </p:txBody>
+          </p:sp>
+        </mc:Choice>
+        <mc:Fallback>
+          <p:sp>
+            <p:nvSpPr>
+              <p:cNvPr id="56" name="TextBox 55">
+                <a:extLst>
+                  <a:ext uri="{FF2B5EF4-FFF2-40B4-BE49-F238E27FC236}">
+                    <a16:creationId xmlns:a16="http://schemas.microsoft.com/office/drawing/2014/main" id="{2E6694B3-01C0-7410-1D19-E1DD3AE0BBDD}"/>
+                  </a:ext>
+                </a:extLst>
+              </p:cNvPr>
+              <p:cNvSpPr txBox="1">
+                <a:spLocks noRot="1" noChangeAspect="1" noMove="1" noResize="1" noEditPoints="1" noAdjustHandles="1" noChangeArrowheads="1" noChangeShapeType="1" noTextEdit="1"/>
+              </p:cNvSpPr>
+              <p:nvPr/>
+            </p:nvSpPr>
+            <p:spPr>
+              <a:xfrm>
+                <a:off x="1330229" y="2926594"/>
+                <a:ext cx="181140" cy="276999"/>
+              </a:xfrm>
+              <a:prstGeom prst="rect">
+                <a:avLst/>
+              </a:prstGeom>
+              <a:blipFill>
+                <a:blip r:embed="rId12"/>
+                <a:stretch>
+                  <a:fillRect l="-30000" r="-30000" b="-6522"/>
+                </a:stretch>
+              </a:blipFill>
+            </p:spPr>
+            <p:txBody>
+              <a:bodyPr/>
+              <a:lstStyle/>
+              <a:p>
+                <a:r>
+                  <a:rPr lang="en-US">
+                    <a:noFill/>
+                  </a:rPr>
+                  <a:t> </a:t>
+                </a:r>
+              </a:p>
+            </p:txBody>
+          </p:sp>
+        </mc:Fallback>
+      </mc:AlternateContent>
+      <mc:AlternateContent xmlns:mc="http://schemas.openxmlformats.org/markup-compatibility/2006">
+        <mc:Choice xmlns:a14="http://schemas.microsoft.com/office/drawing/2010/main" Requires="a14">
+          <p:sp>
+            <p:nvSpPr>
+              <p:cNvPr id="57" name="TextBox 56">
+                <a:extLst>
+                  <a:ext uri="{FF2B5EF4-FFF2-40B4-BE49-F238E27FC236}">
+                    <a16:creationId xmlns:a16="http://schemas.microsoft.com/office/drawing/2014/main" id="{71AA11AE-0EF6-C641-4501-65BB2D85E678}"/>
+                  </a:ext>
+                </a:extLst>
+              </p:cNvPr>
+              <p:cNvSpPr txBox="1"/>
+              <p:nvPr/>
+            </p:nvSpPr>
+            <p:spPr>
+              <a:xfrm>
+                <a:off x="1325493" y="3186366"/>
+                <a:ext cx="181140" cy="276999"/>
+              </a:xfrm>
+              <a:prstGeom prst="rect">
+                <a:avLst/>
+              </a:prstGeom>
+              <a:noFill/>
+            </p:spPr>
+            <p:txBody>
+              <a:bodyPr wrap="none" lIns="0" tIns="0" rIns="0" bIns="0" rtlCol="0">
+                <a:spAutoFit/>
+              </a:bodyPr>
+              <a:lstStyle/>
+              <a:p>
+                <a14:m>
+                  <m:oMathPara xmlns:m="http://schemas.openxmlformats.org/officeDocument/2006/math">
+                    <m:oMathParaPr>
+                      <m:jc m:val="centerGroup"/>
+                    </m:oMathParaPr>
+                    <m:oMath xmlns:m="http://schemas.openxmlformats.org/officeDocument/2006/math">
+                      <m:r>
+                        <a:rPr lang="en-US" b="0" i="1" smtClean="0">
+                          <a:latin typeface="Cambria Math" panose="02040503050406030204" pitchFamily="18" charset="0"/>
+                        </a:rPr>
+                        <m:t>3</m:t>
+                      </m:r>
+                    </m:oMath>
+                  </m:oMathPara>
+                </a14:m>
+                <a:endParaRPr lang="en-US" dirty="0"/>
+              </a:p>
+            </p:txBody>
+          </p:sp>
+        </mc:Choice>
+        <mc:Fallback>
+          <p:sp>
+            <p:nvSpPr>
+              <p:cNvPr id="57" name="TextBox 56">
+                <a:extLst>
+                  <a:ext uri="{FF2B5EF4-FFF2-40B4-BE49-F238E27FC236}">
+                    <a16:creationId xmlns:a16="http://schemas.microsoft.com/office/drawing/2014/main" id="{71AA11AE-0EF6-C641-4501-65BB2D85E678}"/>
+                  </a:ext>
+                </a:extLst>
+              </p:cNvPr>
+              <p:cNvSpPr txBox="1">
+                <a:spLocks noRot="1" noChangeAspect="1" noMove="1" noResize="1" noEditPoints="1" noAdjustHandles="1" noChangeArrowheads="1" noChangeShapeType="1" noTextEdit="1"/>
+              </p:cNvSpPr>
+              <p:nvPr/>
+            </p:nvSpPr>
+            <p:spPr>
+              <a:xfrm>
+                <a:off x="1325493" y="3186366"/>
+                <a:ext cx="181140" cy="276999"/>
+              </a:xfrm>
+              <a:prstGeom prst="rect">
+                <a:avLst/>
+              </a:prstGeom>
+              <a:blipFill>
+                <a:blip r:embed="rId13"/>
+                <a:stretch>
+                  <a:fillRect l="-30000" r="-30000" b="-6667"/>
+                </a:stretch>
+              </a:blipFill>
+            </p:spPr>
+            <p:txBody>
+              <a:bodyPr/>
+              <a:lstStyle/>
+              <a:p>
+                <a:r>
+                  <a:rPr lang="en-US">
+                    <a:noFill/>
+                  </a:rPr>
+                  <a:t> </a:t>
+                </a:r>
+              </a:p>
+            </p:txBody>
+          </p:sp>
+        </mc:Fallback>
+      </mc:AlternateContent>
+      <p:sp>
+        <p:nvSpPr>
+          <p:cNvPr id="59" name="Oval 58">
+            <a:extLst>
+              <a:ext uri="{FF2B5EF4-FFF2-40B4-BE49-F238E27FC236}">
+                <a16:creationId xmlns:a16="http://schemas.microsoft.com/office/drawing/2014/main" id="{2919D12F-522E-2D47-4044-2D5C8977E8FB}"/>
+              </a:ext>
+            </a:extLst>
+          </p:cNvPr>
+          <p:cNvSpPr/>
+          <p:nvPr/>
+        </p:nvSpPr>
+        <p:spPr>
+          <a:xfrm>
+            <a:off x="5253081" y="2497752"/>
+            <a:ext cx="182880" cy="182880"/>
+          </a:xfrm>
+          <a:prstGeom prst="ellipse">
+            <a:avLst/>
+          </a:prstGeom>
+        </p:spPr>
+        <p:style>
+          <a:lnRef idx="2">
+            <a:schemeClr val="accent1">
+              <a:shade val="15000"/>
+            </a:schemeClr>
+          </a:lnRef>
+          <a:fillRef idx="1">
+            <a:schemeClr val="accent1"/>
+          </a:fillRef>
+          <a:effectRef idx="0">
+            <a:schemeClr val="accent1"/>
+          </a:effectRef>
+          <a:fontRef idx="minor">
+            <a:schemeClr val="lt1"/>
+          </a:fontRef>
+        </p:style>
+        <p:txBody>
+          <a:bodyPr rtlCol="0" anchor="ctr"/>
+          <a:lstStyle/>
+          <a:p>
+            <a:pPr algn="ctr"/>
+            <a:endParaRPr lang="en-US"/>
+          </a:p>
+        </p:txBody>
+      </p:sp>
+      <p:sp>
+        <p:nvSpPr>
+          <p:cNvPr id="60" name="TextBox 59">
+            <a:extLst>
+              <a:ext uri="{FF2B5EF4-FFF2-40B4-BE49-F238E27FC236}">
+                <a16:creationId xmlns:a16="http://schemas.microsoft.com/office/drawing/2014/main" id="{2FC08AB1-94F7-892B-E0E5-FE1ECDFC6381}"/>
+              </a:ext>
+            </a:extLst>
+          </p:cNvPr>
+          <p:cNvSpPr txBox="1"/>
+          <p:nvPr/>
+        </p:nvSpPr>
+        <p:spPr>
+          <a:xfrm>
+            <a:off x="5459931" y="2794147"/>
+            <a:ext cx="902494" cy="307777"/>
+          </a:xfrm>
+          <a:prstGeom prst="rect">
+            <a:avLst/>
+          </a:prstGeom>
+          <a:noFill/>
+        </p:spPr>
+        <p:txBody>
+          <a:bodyPr wrap="square" rtlCol="0">
+            <a:spAutoFit/>
+          </a:bodyPr>
+          <a:lstStyle/>
+          <a:p>
+            <a:r>
+              <a:rPr lang="en-US" sz="1400" dirty="0"/>
+              <a:t>CX gate</a:t>
+            </a:r>
+          </a:p>
+        </p:txBody>
+      </p:sp>
+      <p:sp>
+        <p:nvSpPr>
+          <p:cNvPr id="61" name="TextBox 60">
+            <a:extLst>
+              <a:ext uri="{FF2B5EF4-FFF2-40B4-BE49-F238E27FC236}">
+                <a16:creationId xmlns:a16="http://schemas.microsoft.com/office/drawing/2014/main" id="{DED6C5B4-51A2-31D3-9057-CABCDEC8E8DD}"/>
+              </a:ext>
+            </a:extLst>
+          </p:cNvPr>
+          <p:cNvSpPr txBox="1"/>
+          <p:nvPr/>
+        </p:nvSpPr>
+        <p:spPr>
+          <a:xfrm>
+            <a:off x="5453281" y="2435246"/>
+            <a:ext cx="1028164" cy="307777"/>
+          </a:xfrm>
+          <a:prstGeom prst="rect">
+            <a:avLst/>
+          </a:prstGeom>
+          <a:noFill/>
+        </p:spPr>
+        <p:txBody>
+          <a:bodyPr wrap="square" rtlCol="0">
+            <a:spAutoFit/>
+          </a:bodyPr>
+          <a:lstStyle/>
+          <a:p>
+            <a:r>
+              <a:rPr lang="en-US" sz="1400" dirty="0"/>
+              <a:t>Other gates</a:t>
+            </a:r>
+          </a:p>
+        </p:txBody>
+      </p:sp>
+      <p:sp>
+        <p:nvSpPr>
+          <p:cNvPr id="62" name="Rectangle 61">
+            <a:extLst>
+              <a:ext uri="{FF2B5EF4-FFF2-40B4-BE49-F238E27FC236}">
+                <a16:creationId xmlns:a16="http://schemas.microsoft.com/office/drawing/2014/main" id="{FA40DB74-B6E1-23A0-16CE-953BB0624F59}"/>
+              </a:ext>
+            </a:extLst>
+          </p:cNvPr>
+          <p:cNvSpPr/>
+          <p:nvPr/>
+        </p:nvSpPr>
+        <p:spPr>
+          <a:xfrm>
+            <a:off x="5167866" y="2400839"/>
+            <a:ext cx="1344361" cy="785527"/>
+          </a:xfrm>
+          <a:prstGeom prst="rect">
+            <a:avLst/>
+          </a:prstGeom>
+          <a:noFill/>
+          <a:ln>
+            <a:solidFill>
+              <a:schemeClr val="tx1"/>
+            </a:solidFill>
+            <a:prstDash val="lgDash"/>
+          </a:ln>
+        </p:spPr>
+        <p:style>
+          <a:lnRef idx="2">
+            <a:schemeClr val="accent1">
+              <a:shade val="15000"/>
+            </a:schemeClr>
+          </a:lnRef>
+          <a:fillRef idx="1">
+            <a:schemeClr val="accent1"/>
+          </a:fillRef>
+          <a:effectRef idx="0">
+            <a:schemeClr val="accent1"/>
+          </a:effectRef>
+          <a:fontRef idx="minor">
+            <a:schemeClr val="lt1"/>
+          </a:fontRef>
+        </p:style>
+        <p:txBody>
+          <a:bodyPr rtlCol="0" anchor="ctr"/>
+          <a:lstStyle/>
+          <a:p>
+            <a:pPr algn="ctr"/>
+            <a:endParaRPr lang="en-VN" sz="1000">
+              <a:latin typeface="Courant" panose="02000509030000020004" pitchFamily="49" charset="0"/>
+              <a:cs typeface="Noto Sans Oriya" panose="020B0502040504020204" pitchFamily="34" charset="0"/>
+            </a:endParaRPr>
+          </a:p>
+        </p:txBody>
+      </p:sp>
+      <p:cxnSp>
+        <p:nvCxnSpPr>
+          <p:cNvPr id="63" name="Đường nối Thẳng 9">
+            <a:extLst>
+              <a:ext uri="{FF2B5EF4-FFF2-40B4-BE49-F238E27FC236}">
+                <a16:creationId xmlns:a16="http://schemas.microsoft.com/office/drawing/2014/main" id="{490BAFFB-71B0-2013-FF27-D10AF36CD174}"/>
+              </a:ext>
+            </a:extLst>
+          </p:cNvPr>
+          <p:cNvCxnSpPr>
+            <a:cxnSpLocks/>
+          </p:cNvCxnSpPr>
+          <p:nvPr/>
+        </p:nvCxnSpPr>
+        <p:spPr>
+          <a:xfrm>
+            <a:off x="4186704" y="2545552"/>
+            <a:ext cx="822960" cy="0"/>
+          </a:xfrm>
+          <a:prstGeom prst="line">
+            <a:avLst/>
+          </a:prstGeom>
+          <a:ln w="38100"/>
+        </p:spPr>
+        <p:style>
+          <a:lnRef idx="1">
+            <a:schemeClr val="dk1"/>
+          </a:lnRef>
+          <a:fillRef idx="0">
+            <a:schemeClr val="dk1"/>
+          </a:fillRef>
+          <a:effectRef idx="0">
+            <a:schemeClr val="dk1"/>
+          </a:effectRef>
+          <a:fontRef idx="minor">
+            <a:schemeClr val="tx1"/>
+          </a:fontRef>
+        </p:style>
+      </p:cxnSp>
+      <p:cxnSp>
+        <p:nvCxnSpPr>
+          <p:cNvPr id="64" name="Đường nối Thẳng 9">
+            <a:extLst>
+              <a:ext uri="{FF2B5EF4-FFF2-40B4-BE49-F238E27FC236}">
+                <a16:creationId xmlns:a16="http://schemas.microsoft.com/office/drawing/2014/main" id="{6F00692B-AF11-0A3D-44E7-C5BFDE818801}"/>
+              </a:ext>
+            </a:extLst>
+          </p:cNvPr>
+          <p:cNvCxnSpPr>
+            <a:cxnSpLocks/>
+          </p:cNvCxnSpPr>
+          <p:nvPr/>
+        </p:nvCxnSpPr>
+        <p:spPr>
+          <a:xfrm>
+            <a:off x="4186704" y="2809077"/>
+            <a:ext cx="822960" cy="0"/>
+          </a:xfrm>
+          <a:prstGeom prst="line">
+            <a:avLst/>
+          </a:prstGeom>
+          <a:ln w="38100"/>
+        </p:spPr>
+        <p:style>
+          <a:lnRef idx="1">
+            <a:schemeClr val="dk1"/>
+          </a:lnRef>
+          <a:fillRef idx="0">
+            <a:schemeClr val="dk1"/>
+          </a:fillRef>
+          <a:effectRef idx="0">
+            <a:schemeClr val="dk1"/>
+          </a:effectRef>
+          <a:fontRef idx="minor">
+            <a:schemeClr val="tx1"/>
+          </a:fontRef>
+        </p:style>
+      </p:cxnSp>
+      <p:cxnSp>
+        <p:nvCxnSpPr>
+          <p:cNvPr id="65" name="Đường nối Thẳng 9">
+            <a:extLst>
+              <a:ext uri="{FF2B5EF4-FFF2-40B4-BE49-F238E27FC236}">
+                <a16:creationId xmlns:a16="http://schemas.microsoft.com/office/drawing/2014/main" id="{930B4050-8A3D-61BD-B005-D756312D3B1D}"/>
+              </a:ext>
+            </a:extLst>
+          </p:cNvPr>
+          <p:cNvCxnSpPr>
+            <a:cxnSpLocks/>
+          </p:cNvCxnSpPr>
+          <p:nvPr/>
+        </p:nvCxnSpPr>
+        <p:spPr>
+          <a:xfrm>
+            <a:off x="4186704" y="3072602"/>
+            <a:ext cx="822960" cy="0"/>
+          </a:xfrm>
+          <a:prstGeom prst="line">
+            <a:avLst/>
+          </a:prstGeom>
+          <a:ln w="38100"/>
+        </p:spPr>
+        <p:style>
+          <a:lnRef idx="1">
+            <a:schemeClr val="dk1"/>
+          </a:lnRef>
+          <a:fillRef idx="0">
+            <a:schemeClr val="dk1"/>
+          </a:fillRef>
+          <a:effectRef idx="0">
+            <a:schemeClr val="dk1"/>
+          </a:effectRef>
+          <a:fontRef idx="minor">
+            <a:schemeClr val="tx1"/>
+          </a:fontRef>
+        </p:style>
+      </p:cxnSp>
+      <p:cxnSp>
+        <p:nvCxnSpPr>
+          <p:cNvPr id="66" name="Đường nối Thẳng 9">
+            <a:extLst>
+              <a:ext uri="{FF2B5EF4-FFF2-40B4-BE49-F238E27FC236}">
+                <a16:creationId xmlns:a16="http://schemas.microsoft.com/office/drawing/2014/main" id="{41CFAEAF-DBD6-ED19-2336-66182DDDD149}"/>
+              </a:ext>
+            </a:extLst>
+          </p:cNvPr>
+          <p:cNvCxnSpPr>
+            <a:cxnSpLocks/>
+          </p:cNvCxnSpPr>
+          <p:nvPr/>
+        </p:nvCxnSpPr>
+        <p:spPr>
+          <a:xfrm>
+            <a:off x="4186704" y="3336127"/>
+            <a:ext cx="822960" cy="0"/>
+          </a:xfrm>
+          <a:prstGeom prst="line">
+            <a:avLst/>
+          </a:prstGeom>
+          <a:ln w="38100"/>
+        </p:spPr>
+        <p:style>
+          <a:lnRef idx="1">
+            <a:schemeClr val="dk1"/>
+          </a:lnRef>
+          <a:fillRef idx="0">
+            <a:schemeClr val="dk1"/>
+          </a:fillRef>
+          <a:effectRef idx="0">
+            <a:schemeClr val="dk1"/>
+          </a:effectRef>
+          <a:fontRef idx="minor">
+            <a:schemeClr val="tx1"/>
+          </a:fontRef>
+        </p:style>
+      </p:cxnSp>
+      <mc:AlternateContent xmlns:mc="http://schemas.openxmlformats.org/markup-compatibility/2006">
+        <mc:Choice xmlns:a14="http://schemas.microsoft.com/office/drawing/2010/main" Requires="a14">
+          <p:sp>
+            <p:nvSpPr>
+              <p:cNvPr id="68" name="TextBox 67">
+                <a:extLst>
+                  <a:ext uri="{FF2B5EF4-FFF2-40B4-BE49-F238E27FC236}">
+                    <a16:creationId xmlns:a16="http://schemas.microsoft.com/office/drawing/2014/main" id="{5A17837B-870A-50A7-E4AF-424C9E13767D}"/>
+                  </a:ext>
+                </a:extLst>
+              </p:cNvPr>
+              <p:cNvSpPr txBox="1"/>
+              <p:nvPr/>
+            </p:nvSpPr>
+            <p:spPr>
+              <a:xfrm>
+                <a:off x="3994028" y="2793355"/>
+                <a:ext cx="125034" cy="276999"/>
+              </a:xfrm>
+              <a:prstGeom prst="rect">
+                <a:avLst/>
+              </a:prstGeom>
+              <a:noFill/>
+            </p:spPr>
+            <p:txBody>
+              <a:bodyPr wrap="none" lIns="0" tIns="0" rIns="0" bIns="0" rtlCol="0">
+                <a:spAutoFit/>
+              </a:bodyPr>
+              <a:lstStyle/>
+              <a:p>
+                <a14:m>
+                  <m:oMathPara xmlns:m="http://schemas.openxmlformats.org/officeDocument/2006/math">
+                    <m:oMathParaPr>
+                      <m:jc m:val="centerGroup"/>
+                    </m:oMathParaPr>
+                    <m:oMath xmlns:m="http://schemas.openxmlformats.org/officeDocument/2006/math">
+                      <m:r>
+                        <a:rPr lang="en-US" i="1" smtClean="0">
+                          <a:latin typeface="Cambria Math" panose="02040503050406030204" pitchFamily="18" charset="0"/>
+                        </a:rPr>
+                        <m:t>⋮</m:t>
+                      </m:r>
+                    </m:oMath>
+                  </m:oMathPara>
+                </a14:m>
+                <a:endParaRPr lang="en-US" dirty="0"/>
+              </a:p>
+            </p:txBody>
+          </p:sp>
+        </mc:Choice>
+        <mc:Fallback>
+          <p:sp>
+            <p:nvSpPr>
+              <p:cNvPr id="68" name="TextBox 67">
+                <a:extLst>
+                  <a:ext uri="{FF2B5EF4-FFF2-40B4-BE49-F238E27FC236}">
+                    <a16:creationId xmlns:a16="http://schemas.microsoft.com/office/drawing/2014/main" id="{5A17837B-870A-50A7-E4AF-424C9E13767D}"/>
+                  </a:ext>
+                </a:extLst>
+              </p:cNvPr>
+              <p:cNvSpPr txBox="1">
+                <a:spLocks noRot="1" noChangeAspect="1" noMove="1" noResize="1" noEditPoints="1" noAdjustHandles="1" noChangeArrowheads="1" noChangeShapeType="1" noTextEdit="1"/>
+              </p:cNvSpPr>
+              <p:nvPr/>
+            </p:nvSpPr>
+            <p:spPr>
+              <a:xfrm>
+                <a:off x="3994028" y="2793355"/>
+                <a:ext cx="125034" cy="276999"/>
+              </a:xfrm>
+              <a:prstGeom prst="rect">
+                <a:avLst/>
+              </a:prstGeom>
+              <a:blipFill>
+                <a:blip r:embed="rId14"/>
+                <a:stretch>
+                  <a:fillRect l="-42857" r="-38095" b="-4348"/>
+                </a:stretch>
+              </a:blipFill>
+            </p:spPr>
+            <p:txBody>
+              <a:bodyPr/>
+              <a:lstStyle/>
+              <a:p>
+                <a:r>
+                  <a:rPr lang="en-US">
+                    <a:noFill/>
+                  </a:rPr>
+                  <a:t> </a:t>
+                </a:r>
+              </a:p>
+            </p:txBody>
+          </p:sp>
+        </mc:Fallback>
+      </mc:AlternateContent>
+      <p:grpSp>
+        <p:nvGrpSpPr>
+          <p:cNvPr id="70" name="Group 69">
+            <a:extLst>
+              <a:ext uri="{FF2B5EF4-FFF2-40B4-BE49-F238E27FC236}">
+                <a16:creationId xmlns:a16="http://schemas.microsoft.com/office/drawing/2014/main" id="{8CCB733C-411A-3896-BD12-A2B4A8498129}"/>
+              </a:ext>
+            </a:extLst>
+          </p:cNvPr>
+          <p:cNvGrpSpPr/>
+          <p:nvPr/>
+        </p:nvGrpSpPr>
+        <p:grpSpPr>
+          <a:xfrm>
+            <a:off x="4104280" y="2562224"/>
+            <a:ext cx="681037" cy="424337"/>
+            <a:chOff x="2438400" y="2562225"/>
+            <a:chExt cx="681037" cy="424337"/>
+          </a:xfrm>
+        </p:grpSpPr>
+        <p:cxnSp>
+          <p:nvCxnSpPr>
+            <p:cNvPr id="71" name="Straight Connector 70">
+              <a:extLst>
+                <a:ext uri="{FF2B5EF4-FFF2-40B4-BE49-F238E27FC236}">
+                  <a16:creationId xmlns:a16="http://schemas.microsoft.com/office/drawing/2014/main" id="{81CC80FC-2916-D1CE-D03E-B72E557EBF97}"/>
+                </a:ext>
+              </a:extLst>
+            </p:cNvPr>
+            <p:cNvCxnSpPr/>
+            <p:nvPr/>
+          </p:nvCxnSpPr>
+          <p:spPr>
+            <a:xfrm>
+              <a:off x="2778919" y="2562225"/>
+              <a:ext cx="0" cy="269081"/>
+            </a:xfrm>
+            <a:prstGeom prst="line">
+              <a:avLst/>
+            </a:prstGeom>
+            <a:ln w="28575"/>
+          </p:spPr>
+          <p:style>
+            <a:lnRef idx="1">
+              <a:schemeClr val="dk1"/>
+            </a:lnRef>
+            <a:fillRef idx="0">
+              <a:schemeClr val="dk1"/>
+            </a:fillRef>
+            <a:effectRef idx="0">
+              <a:schemeClr val="dk1"/>
+            </a:effectRef>
+            <a:fontRef idx="minor">
+              <a:schemeClr val="tx1"/>
+            </a:fontRef>
+          </p:style>
+        </p:cxnSp>
+        <mc:AlternateContent xmlns:mc="http://schemas.openxmlformats.org/markup-compatibility/2006">
+          <mc:Choice xmlns:a14="http://schemas.microsoft.com/office/drawing/2010/main" Requires="a14">
+            <p:sp>
+              <p:nvSpPr>
+                <p:cNvPr id="72" name="TextBox 71">
+                  <a:extLst>
+                    <a:ext uri="{FF2B5EF4-FFF2-40B4-BE49-F238E27FC236}">
+                      <a16:creationId xmlns:a16="http://schemas.microsoft.com/office/drawing/2014/main" id="{D6D95DFD-BB98-76B2-8CA3-3DA82C2AC759}"/>
+                    </a:ext>
+                  </a:extLst>
+                </p:cNvPr>
+                <p:cNvSpPr txBox="1"/>
+                <p:nvPr/>
+              </p:nvSpPr>
+              <p:spPr>
+                <a:xfrm>
+                  <a:off x="2438400" y="2617230"/>
+                  <a:ext cx="681037" cy="369332"/>
+                </a:xfrm>
+                <a:prstGeom prst="rect">
+                  <a:avLst/>
+                </a:prstGeom>
+                <a:noFill/>
+              </p:spPr>
+              <p:txBody>
+                <a:bodyPr wrap="square" rtlCol="0">
+                  <a:spAutoFit/>
+                </a:bodyPr>
+                <a:lstStyle/>
+                <a:p>
+                  <a14:m>
+                    <m:oMathPara xmlns:m="http://schemas.openxmlformats.org/officeDocument/2006/math">
+                      <m:oMathParaPr>
+                        <m:jc m:val="centerGroup"/>
+                      </m:oMathParaPr>
+                      <m:oMath xmlns:m="http://schemas.openxmlformats.org/officeDocument/2006/math">
+                        <m:r>
+                          <a:rPr lang="en-US" b="0" i="1" smtClean="0">
+                            <a:latin typeface="Cambria Math" panose="02040503050406030204" pitchFamily="18" charset="0"/>
+                          </a:rPr>
+                          <m:t>×</m:t>
+                        </m:r>
+                      </m:oMath>
+                    </m:oMathPara>
+                  </a14:m>
+                  <a:endParaRPr lang="en-US" dirty="0"/>
+                </a:p>
+              </p:txBody>
+            </p:sp>
+          </mc:Choice>
+          <mc:Fallback>
+            <p:sp>
+              <p:nvSpPr>
+                <p:cNvPr id="72" name="TextBox 71">
+                  <a:extLst>
+                    <a:ext uri="{FF2B5EF4-FFF2-40B4-BE49-F238E27FC236}">
+                      <a16:creationId xmlns:a16="http://schemas.microsoft.com/office/drawing/2014/main" id="{D6D95DFD-BB98-76B2-8CA3-3DA82C2AC759}"/>
+                    </a:ext>
+                  </a:extLst>
+                </p:cNvPr>
+                <p:cNvSpPr txBox="1">
+                  <a:spLocks noRot="1" noChangeAspect="1" noMove="1" noResize="1" noEditPoints="1" noAdjustHandles="1" noChangeArrowheads="1" noChangeShapeType="1" noTextEdit="1"/>
+                </p:cNvSpPr>
+                <p:nvPr/>
+              </p:nvSpPr>
+              <p:spPr>
+                <a:xfrm>
+                  <a:off x="2438400" y="2617230"/>
+                  <a:ext cx="681037" cy="369332"/>
+                </a:xfrm>
+                <a:prstGeom prst="rect">
+                  <a:avLst/>
+                </a:prstGeom>
+                <a:blipFill>
+                  <a:blip r:embed="rId15"/>
+                  <a:stretch>
+                    <a:fillRect/>
+                  </a:stretch>
+                </a:blipFill>
+              </p:spPr>
+              <p:txBody>
+                <a:bodyPr/>
+                <a:lstStyle/>
+                <a:p>
+                  <a:r>
+                    <a:rPr lang="en-US">
+                      <a:noFill/>
+                    </a:rPr>
+                    <a:t> </a:t>
+                  </a:r>
+                </a:p>
+              </p:txBody>
+            </p:sp>
+          </mc:Fallback>
+        </mc:AlternateContent>
+      </p:grpSp>
+      <p:grpSp>
+        <p:nvGrpSpPr>
+          <p:cNvPr id="73" name="Group 72">
+            <a:extLst>
+              <a:ext uri="{FF2B5EF4-FFF2-40B4-BE49-F238E27FC236}">
+                <a16:creationId xmlns:a16="http://schemas.microsoft.com/office/drawing/2014/main" id="{5C5BDE70-874F-D48A-ED72-7DDF3A16A17B}"/>
+              </a:ext>
+            </a:extLst>
+          </p:cNvPr>
+          <p:cNvGrpSpPr/>
+          <p:nvPr/>
+        </p:nvGrpSpPr>
+        <p:grpSpPr>
+          <a:xfrm>
+            <a:off x="4528585" y="3083972"/>
+            <a:ext cx="681037" cy="424337"/>
+            <a:chOff x="2438400" y="2562225"/>
+            <a:chExt cx="681037" cy="424337"/>
+          </a:xfrm>
+        </p:grpSpPr>
+        <p:cxnSp>
+          <p:nvCxnSpPr>
+            <p:cNvPr id="74" name="Straight Connector 73">
+              <a:extLst>
+                <a:ext uri="{FF2B5EF4-FFF2-40B4-BE49-F238E27FC236}">
+                  <a16:creationId xmlns:a16="http://schemas.microsoft.com/office/drawing/2014/main" id="{16D691A6-08A6-E086-3FD0-58F7329804A9}"/>
+                </a:ext>
+              </a:extLst>
+            </p:cNvPr>
+            <p:cNvCxnSpPr/>
+            <p:nvPr/>
+          </p:nvCxnSpPr>
+          <p:spPr>
+            <a:xfrm>
+              <a:off x="2778919" y="2562225"/>
+              <a:ext cx="0" cy="269081"/>
+            </a:xfrm>
+            <a:prstGeom prst="line">
+              <a:avLst/>
+            </a:prstGeom>
+            <a:ln w="28575"/>
+          </p:spPr>
+          <p:style>
+            <a:lnRef idx="1">
+              <a:schemeClr val="dk1"/>
+            </a:lnRef>
+            <a:fillRef idx="0">
+              <a:schemeClr val="dk1"/>
+            </a:fillRef>
+            <a:effectRef idx="0">
+              <a:schemeClr val="dk1"/>
+            </a:effectRef>
+            <a:fontRef idx="minor">
+              <a:schemeClr val="tx1"/>
+            </a:fontRef>
+          </p:style>
+        </p:cxnSp>
+        <mc:AlternateContent xmlns:mc="http://schemas.openxmlformats.org/markup-compatibility/2006">
+          <mc:Choice xmlns:a14="http://schemas.microsoft.com/office/drawing/2010/main" Requires="a14">
+            <p:sp>
+              <p:nvSpPr>
+                <p:cNvPr id="75" name="TextBox 74">
+                  <a:extLst>
+                    <a:ext uri="{FF2B5EF4-FFF2-40B4-BE49-F238E27FC236}">
+                      <a16:creationId xmlns:a16="http://schemas.microsoft.com/office/drawing/2014/main" id="{2B8D6F2E-0446-8DA4-D5F9-ACFDA9E6DF7F}"/>
+                    </a:ext>
+                  </a:extLst>
+                </p:cNvPr>
+                <p:cNvSpPr txBox="1"/>
+                <p:nvPr/>
+              </p:nvSpPr>
+              <p:spPr>
+                <a:xfrm>
+                  <a:off x="2438400" y="2617230"/>
+                  <a:ext cx="681037" cy="369332"/>
+                </a:xfrm>
+                <a:prstGeom prst="rect">
+                  <a:avLst/>
+                </a:prstGeom>
+                <a:noFill/>
+              </p:spPr>
+              <p:txBody>
+                <a:bodyPr wrap="square" rtlCol="0">
+                  <a:spAutoFit/>
+                </a:bodyPr>
+                <a:lstStyle/>
+                <a:p>
+                  <a14:m>
+                    <m:oMathPara xmlns:m="http://schemas.openxmlformats.org/officeDocument/2006/math">
+                      <m:oMathParaPr>
+                        <m:jc m:val="centerGroup"/>
+                      </m:oMathParaPr>
+                      <m:oMath xmlns:m="http://schemas.openxmlformats.org/officeDocument/2006/math">
+                        <m:r>
+                          <a:rPr lang="en-US" b="0" i="1" smtClean="0">
+                            <a:latin typeface="Cambria Math" panose="02040503050406030204" pitchFamily="18" charset="0"/>
+                          </a:rPr>
+                          <m:t>×</m:t>
+                        </m:r>
+                      </m:oMath>
+                    </m:oMathPara>
+                  </a14:m>
+                  <a:endParaRPr lang="en-US" dirty="0"/>
+                </a:p>
+              </p:txBody>
+            </p:sp>
+          </mc:Choice>
+          <mc:Fallback>
+            <p:sp>
+              <p:nvSpPr>
+                <p:cNvPr id="75" name="TextBox 74">
+                  <a:extLst>
+                    <a:ext uri="{FF2B5EF4-FFF2-40B4-BE49-F238E27FC236}">
+                      <a16:creationId xmlns:a16="http://schemas.microsoft.com/office/drawing/2014/main" id="{2B8D6F2E-0446-8DA4-D5F9-ACFDA9E6DF7F}"/>
+                    </a:ext>
+                  </a:extLst>
+                </p:cNvPr>
+                <p:cNvSpPr txBox="1">
+                  <a:spLocks noRot="1" noChangeAspect="1" noMove="1" noResize="1" noEditPoints="1" noAdjustHandles="1" noChangeArrowheads="1" noChangeShapeType="1" noTextEdit="1"/>
+                </p:cNvSpPr>
+                <p:nvPr/>
+              </p:nvSpPr>
+              <p:spPr>
+                <a:xfrm>
+                  <a:off x="2438400" y="2617230"/>
+                  <a:ext cx="681037" cy="369332"/>
+                </a:xfrm>
+                <a:prstGeom prst="rect">
+                  <a:avLst/>
+                </a:prstGeom>
+                <a:blipFill>
+                  <a:blip r:embed="rId16"/>
+                  <a:stretch>
+                    <a:fillRect/>
+                  </a:stretch>
+                </a:blipFill>
+              </p:spPr>
+              <p:txBody>
+                <a:bodyPr/>
+                <a:lstStyle/>
+                <a:p>
+                  <a:r>
+                    <a:rPr lang="en-US">
+                      <a:noFill/>
+                    </a:rPr>
+                    <a:t> </a:t>
+                  </a:r>
+                </a:p>
+              </p:txBody>
+            </p:sp>
+          </mc:Fallback>
+        </mc:AlternateContent>
+      </p:grpSp>
+      <p:sp>
+        <p:nvSpPr>
+          <p:cNvPr id="76" name="Rectangle: Rounded Corners 75">
+            <a:extLst>
+              <a:ext uri="{FF2B5EF4-FFF2-40B4-BE49-F238E27FC236}">
+                <a16:creationId xmlns:a16="http://schemas.microsoft.com/office/drawing/2014/main" id="{AC3F88A2-F78D-AA88-F0CF-3EDE22C12D17}"/>
+              </a:ext>
+            </a:extLst>
+          </p:cNvPr>
+          <p:cNvSpPr/>
+          <p:nvPr/>
+        </p:nvSpPr>
+        <p:spPr>
+          <a:xfrm>
+            <a:off x="4282079" y="2400838"/>
+            <a:ext cx="684588" cy="1111081"/>
+          </a:xfrm>
+          <a:prstGeom prst="roundRect">
+            <a:avLst/>
+          </a:prstGeom>
+          <a:solidFill>
+            <a:srgbClr val="FF0000">
+              <a:alpha val="20000"/>
+            </a:srgbClr>
+          </a:solidFill>
+          <a:ln>
+            <a:noFill/>
+          </a:ln>
+        </p:spPr>
+        <p:style>
+          <a:lnRef idx="2">
+            <a:schemeClr val="accent1">
+              <a:shade val="15000"/>
+            </a:schemeClr>
+          </a:lnRef>
+          <a:fillRef idx="1">
+            <a:schemeClr val="accent1"/>
+          </a:fillRef>
+          <a:effectRef idx="0">
+            <a:schemeClr val="accent1"/>
+          </a:effectRef>
+          <a:fontRef idx="minor">
+            <a:schemeClr val="lt1"/>
+          </a:fontRef>
+        </p:style>
+        <p:txBody>
+          <a:bodyPr rtlCol="0" anchor="ctr"/>
+          <a:lstStyle/>
+          <a:p>
+            <a:pPr algn="ctr"/>
+            <a:endParaRPr lang="en-US"/>
+          </a:p>
+        </p:txBody>
+      </p:sp>
+      <mc:AlternateContent xmlns:mc="http://schemas.openxmlformats.org/markup-compatibility/2006">
+        <mc:Choice xmlns:a14="http://schemas.microsoft.com/office/drawing/2010/main" Requires="a14">
+          <p:sp>
+            <p:nvSpPr>
+              <p:cNvPr id="77" name="TextBox 76">
+                <a:extLst>
+                  <a:ext uri="{FF2B5EF4-FFF2-40B4-BE49-F238E27FC236}">
+                    <a16:creationId xmlns:a16="http://schemas.microsoft.com/office/drawing/2014/main" id="{40E41B9D-5DE3-4D37-FE14-E41B0F14850F}"/>
+                  </a:ext>
+                </a:extLst>
+              </p:cNvPr>
+              <p:cNvSpPr txBox="1"/>
+              <p:nvPr/>
+            </p:nvSpPr>
+            <p:spPr>
+              <a:xfrm>
+                <a:off x="4282078" y="3565192"/>
+                <a:ext cx="684588" cy="276999"/>
+              </a:xfrm>
+              <a:prstGeom prst="rect">
+                <a:avLst/>
+              </a:prstGeom>
+              <a:noFill/>
+            </p:spPr>
+            <p:txBody>
+              <a:bodyPr wrap="square" lIns="0" tIns="0" rIns="0" bIns="0" rtlCol="0">
+                <a:spAutoFit/>
+              </a:bodyPr>
+              <a:lstStyle/>
+              <a:p>
+                <a14:m>
+                  <m:oMathPara xmlns:m="http://schemas.openxmlformats.org/officeDocument/2006/math">
+                    <m:oMathParaPr>
+                      <m:jc m:val="centerGroup"/>
+                    </m:oMathParaPr>
+                    <m:oMath xmlns:m="http://schemas.openxmlformats.org/officeDocument/2006/math">
+                      <m:sSub>
+                        <m:sSubPr>
+                          <m:ctrlPr>
+                            <a:rPr lang="en-US" b="0" i="1" smtClean="0">
+                              <a:latin typeface="Cambria Math" panose="02040503050406030204" pitchFamily="18" charset="0"/>
+                            </a:rPr>
+                          </m:ctrlPr>
+                        </m:sSubPr>
+                        <m:e>
+                          <m:r>
+                            <a:rPr lang="en-US" b="0" i="1" smtClean="0">
+                              <a:latin typeface="Cambria Math" panose="02040503050406030204" pitchFamily="18" charset="0"/>
+                            </a:rPr>
+                            <m:t>𝑉</m:t>
+                          </m:r>
+                        </m:e>
+                        <m:sub>
+                          <m:r>
+                            <a:rPr lang="en-US" b="0" i="1" smtClean="0">
+                              <a:latin typeface="Cambria Math" panose="02040503050406030204" pitchFamily="18" charset="0"/>
+                            </a:rPr>
+                            <m:t>𝑘</m:t>
+                          </m:r>
+                          <m:r>
+                            <a:rPr lang="en-US" b="0" i="1" smtClean="0">
+                              <a:latin typeface="Cambria Math" panose="02040503050406030204" pitchFamily="18" charset="0"/>
+                            </a:rPr>
+                            <m:t>−1</m:t>
+                          </m:r>
+                        </m:sub>
+                      </m:sSub>
+                    </m:oMath>
+                  </m:oMathPara>
+                </a14:m>
+                <a:endParaRPr lang="en-US" dirty="0"/>
+              </a:p>
+            </p:txBody>
+          </p:sp>
+        </mc:Choice>
+        <mc:Fallback>
+          <p:sp>
+            <p:nvSpPr>
+              <p:cNvPr id="77" name="TextBox 76">
+                <a:extLst>
+                  <a:ext uri="{FF2B5EF4-FFF2-40B4-BE49-F238E27FC236}">
+                    <a16:creationId xmlns:a16="http://schemas.microsoft.com/office/drawing/2014/main" id="{40E41B9D-5DE3-4D37-FE14-E41B0F14850F}"/>
+                  </a:ext>
+                </a:extLst>
+              </p:cNvPr>
+              <p:cNvSpPr txBox="1">
+                <a:spLocks noRot="1" noChangeAspect="1" noMove="1" noResize="1" noEditPoints="1" noAdjustHandles="1" noChangeArrowheads="1" noChangeShapeType="1" noTextEdit="1"/>
+              </p:cNvSpPr>
+              <p:nvPr/>
+            </p:nvSpPr>
+            <p:spPr>
+              <a:xfrm>
+                <a:off x="4282078" y="3565192"/>
+                <a:ext cx="684588" cy="276999"/>
+              </a:xfrm>
+              <a:prstGeom prst="rect">
+                <a:avLst/>
+              </a:prstGeom>
+              <a:blipFill>
+                <a:blip r:embed="rId17"/>
+                <a:stretch>
+                  <a:fillRect b="-17778"/>
+                </a:stretch>
+              </a:blipFill>
+            </p:spPr>
+            <p:txBody>
+              <a:bodyPr/>
+              <a:lstStyle/>
+              <a:p>
+                <a:r>
+                  <a:rPr lang="en-US">
+                    <a:noFill/>
+                  </a:rPr>
+                  <a:t> </a:t>
+                </a:r>
+              </a:p>
+            </p:txBody>
+          </p:sp>
+        </mc:Fallback>
+      </mc:AlternateContent>
+      <p:grpSp>
+        <p:nvGrpSpPr>
+          <p:cNvPr id="78" name="Group 77">
+            <a:extLst>
+              <a:ext uri="{FF2B5EF4-FFF2-40B4-BE49-F238E27FC236}">
+                <a16:creationId xmlns:a16="http://schemas.microsoft.com/office/drawing/2014/main" id="{8EE3E5AD-9CF6-394F-06EE-2FD44A1B320B}"/>
+              </a:ext>
+            </a:extLst>
+          </p:cNvPr>
+          <p:cNvGrpSpPr/>
+          <p:nvPr/>
+        </p:nvGrpSpPr>
+        <p:grpSpPr>
+          <a:xfrm>
+            <a:off x="4311921" y="2824965"/>
+            <a:ext cx="681037" cy="424337"/>
+            <a:chOff x="2438400" y="2562225"/>
+            <a:chExt cx="681037" cy="424337"/>
+          </a:xfrm>
+        </p:grpSpPr>
+        <p:cxnSp>
+          <p:nvCxnSpPr>
+            <p:cNvPr id="79" name="Straight Connector 78">
+              <a:extLst>
+                <a:ext uri="{FF2B5EF4-FFF2-40B4-BE49-F238E27FC236}">
+                  <a16:creationId xmlns:a16="http://schemas.microsoft.com/office/drawing/2014/main" id="{A4DD88C4-04F8-08FC-6A83-D01FEF3AB8D2}"/>
+                </a:ext>
+              </a:extLst>
+            </p:cNvPr>
+            <p:cNvCxnSpPr/>
+            <p:nvPr/>
+          </p:nvCxnSpPr>
+          <p:spPr>
+            <a:xfrm>
+              <a:off x="2778919" y="2562225"/>
+              <a:ext cx="0" cy="269081"/>
+            </a:xfrm>
+            <a:prstGeom prst="line">
+              <a:avLst/>
+            </a:prstGeom>
+            <a:ln w="28575"/>
+          </p:spPr>
+          <p:style>
+            <a:lnRef idx="1">
+              <a:schemeClr val="dk1"/>
+            </a:lnRef>
+            <a:fillRef idx="0">
+              <a:schemeClr val="dk1"/>
+            </a:fillRef>
+            <a:effectRef idx="0">
+              <a:schemeClr val="dk1"/>
+            </a:effectRef>
+            <a:fontRef idx="minor">
+              <a:schemeClr val="tx1"/>
+            </a:fontRef>
+          </p:style>
+        </p:cxnSp>
+        <mc:AlternateContent xmlns:mc="http://schemas.openxmlformats.org/markup-compatibility/2006">
+          <mc:Choice xmlns:a14="http://schemas.microsoft.com/office/drawing/2010/main" Requires="a14">
+            <p:sp>
+              <p:nvSpPr>
+                <p:cNvPr id="80" name="TextBox 79">
+                  <a:extLst>
+                    <a:ext uri="{FF2B5EF4-FFF2-40B4-BE49-F238E27FC236}">
+                      <a16:creationId xmlns:a16="http://schemas.microsoft.com/office/drawing/2014/main" id="{631AF7F2-4F99-150D-D55A-41EB5F5AE6D1}"/>
+                    </a:ext>
+                  </a:extLst>
+                </p:cNvPr>
+                <p:cNvSpPr txBox="1"/>
+                <p:nvPr/>
+              </p:nvSpPr>
+              <p:spPr>
+                <a:xfrm>
+                  <a:off x="2438400" y="2617230"/>
+                  <a:ext cx="681037" cy="369332"/>
+                </a:xfrm>
+                <a:prstGeom prst="rect">
+                  <a:avLst/>
+                </a:prstGeom>
+                <a:noFill/>
+              </p:spPr>
+              <p:txBody>
+                <a:bodyPr wrap="square" rtlCol="0">
+                  <a:spAutoFit/>
+                </a:bodyPr>
+                <a:lstStyle/>
+                <a:p>
+                  <a14:m>
+                    <m:oMathPara xmlns:m="http://schemas.openxmlformats.org/officeDocument/2006/math">
+                      <m:oMathParaPr>
+                        <m:jc m:val="centerGroup"/>
+                      </m:oMathParaPr>
+                      <m:oMath xmlns:m="http://schemas.openxmlformats.org/officeDocument/2006/math">
+                        <m:r>
+                          <a:rPr lang="en-US" b="0" i="1" smtClean="0">
+                            <a:latin typeface="Cambria Math" panose="02040503050406030204" pitchFamily="18" charset="0"/>
+                          </a:rPr>
+                          <m:t>×</m:t>
+                        </m:r>
+                      </m:oMath>
+                    </m:oMathPara>
+                  </a14:m>
+                  <a:endParaRPr lang="en-US" dirty="0"/>
+                </a:p>
+              </p:txBody>
+            </p:sp>
+          </mc:Choice>
+          <mc:Fallback>
+            <p:sp>
+              <p:nvSpPr>
+                <p:cNvPr id="80" name="TextBox 79">
+                  <a:extLst>
+                    <a:ext uri="{FF2B5EF4-FFF2-40B4-BE49-F238E27FC236}">
+                      <a16:creationId xmlns:a16="http://schemas.microsoft.com/office/drawing/2014/main" id="{631AF7F2-4F99-150D-D55A-41EB5F5AE6D1}"/>
+                    </a:ext>
+                  </a:extLst>
+                </p:cNvPr>
+                <p:cNvSpPr txBox="1">
+                  <a:spLocks noRot="1" noChangeAspect="1" noMove="1" noResize="1" noEditPoints="1" noAdjustHandles="1" noChangeArrowheads="1" noChangeShapeType="1" noTextEdit="1"/>
+                </p:cNvSpPr>
+                <p:nvPr/>
+              </p:nvSpPr>
+              <p:spPr>
+                <a:xfrm>
+                  <a:off x="2438400" y="2617230"/>
+                  <a:ext cx="681037" cy="369332"/>
+                </a:xfrm>
+                <a:prstGeom prst="rect">
+                  <a:avLst/>
+                </a:prstGeom>
+                <a:blipFill>
+                  <a:blip r:embed="rId18"/>
+                  <a:stretch>
+                    <a:fillRect/>
+                  </a:stretch>
+                </a:blipFill>
+              </p:spPr>
+              <p:txBody>
+                <a:bodyPr/>
+                <a:lstStyle/>
+                <a:p>
+                  <a:r>
+                    <a:rPr lang="en-US">
+                      <a:noFill/>
+                    </a:rPr>
+                    <a:t> </a:t>
+                  </a:r>
+                </a:p>
+              </p:txBody>
+            </p:sp>
+          </mc:Fallback>
+        </mc:AlternateContent>
+      </p:grpSp>
     </p:spTree>
     <p:extLst>
       <p:ext uri="{BB962C8B-B14F-4D97-AF65-F5344CB8AC3E}">
@@ -15904,6 +17493,146 @@
                                         <p:cTn id="16" dur="1000"/>
                                         <p:tgtEl>
                                           <p:spTgt spid="20"/>
+                                        </p:tgtEl>
+                                      </p:cBhvr>
+                                    </p:animEffect>
+                                  </p:childTnLst>
+                                </p:cTn>
+                              </p:par>
+                              <p:par>
+                                <p:cTn id="17" presetID="10" presetClass="entr" presetSubtype="0" fill="hold" nodeType="withEffect">
+                                  <p:stCondLst>
+                                    <p:cond delay="0"/>
+                                  </p:stCondLst>
+                                  <p:childTnLst>
+                                    <p:set>
+                                      <p:cBhvr>
+                                        <p:cTn id="18" dur="1" fill="hold">
+                                          <p:stCondLst>
+                                            <p:cond delay="0"/>
+                                          </p:stCondLst>
+                                        </p:cTn>
+                                        <p:tgtEl>
+                                          <p:spTgt spid="63"/>
+                                        </p:tgtEl>
+                                        <p:attrNameLst>
+                                          <p:attrName>style.visibility</p:attrName>
+                                        </p:attrNameLst>
+                                      </p:cBhvr>
+                                      <p:to>
+                                        <p:strVal val="visible"/>
+                                      </p:to>
+                                    </p:set>
+                                    <p:animEffect transition="in" filter="fade">
+                                      <p:cBhvr>
+                                        <p:cTn id="19" dur="1000"/>
+                                        <p:tgtEl>
+                                          <p:spTgt spid="63"/>
+                                        </p:tgtEl>
+                                      </p:cBhvr>
+                                    </p:animEffect>
+                                  </p:childTnLst>
+                                </p:cTn>
+                              </p:par>
+                              <p:par>
+                                <p:cTn id="20" presetID="10" presetClass="entr" presetSubtype="0" fill="hold" nodeType="withEffect">
+                                  <p:stCondLst>
+                                    <p:cond delay="0"/>
+                                  </p:stCondLst>
+                                  <p:childTnLst>
+                                    <p:set>
+                                      <p:cBhvr>
+                                        <p:cTn id="21" dur="1" fill="hold">
+                                          <p:stCondLst>
+                                            <p:cond delay="0"/>
+                                          </p:stCondLst>
+                                        </p:cTn>
+                                        <p:tgtEl>
+                                          <p:spTgt spid="64"/>
+                                        </p:tgtEl>
+                                        <p:attrNameLst>
+                                          <p:attrName>style.visibility</p:attrName>
+                                        </p:attrNameLst>
+                                      </p:cBhvr>
+                                      <p:to>
+                                        <p:strVal val="visible"/>
+                                      </p:to>
+                                    </p:set>
+                                    <p:animEffect transition="in" filter="fade">
+                                      <p:cBhvr>
+                                        <p:cTn id="22" dur="1000"/>
+                                        <p:tgtEl>
+                                          <p:spTgt spid="64"/>
+                                        </p:tgtEl>
+                                      </p:cBhvr>
+                                    </p:animEffect>
+                                  </p:childTnLst>
+                                </p:cTn>
+                              </p:par>
+                              <p:par>
+                                <p:cTn id="23" presetID="10" presetClass="entr" presetSubtype="0" fill="hold" nodeType="withEffect">
+                                  <p:stCondLst>
+                                    <p:cond delay="0"/>
+                                  </p:stCondLst>
+                                  <p:childTnLst>
+                                    <p:set>
+                                      <p:cBhvr>
+                                        <p:cTn id="24" dur="1" fill="hold">
+                                          <p:stCondLst>
+                                            <p:cond delay="0"/>
+                                          </p:stCondLst>
+                                        </p:cTn>
+                                        <p:tgtEl>
+                                          <p:spTgt spid="65"/>
+                                        </p:tgtEl>
+                                        <p:attrNameLst>
+                                          <p:attrName>style.visibility</p:attrName>
+                                        </p:attrNameLst>
+                                      </p:cBhvr>
+                                      <p:to>
+                                        <p:strVal val="visible"/>
+                                      </p:to>
+                                    </p:set>
+                                    <p:animEffect transition="in" filter="fade">
+                                      <p:cBhvr>
+                                        <p:cTn id="25" dur="1000"/>
+                                        <p:tgtEl>
+                                          <p:spTgt spid="65"/>
+                                        </p:tgtEl>
+                                      </p:cBhvr>
+                                    </p:animEffect>
+                                  </p:childTnLst>
+                                </p:cTn>
+                              </p:par>
+                              <p:par>
+                                <p:cTn id="26" presetID="10" presetClass="entr" presetSubtype="0" fill="hold" nodeType="withEffect">
+                                  <p:stCondLst>
+                                    <p:cond delay="0"/>
+                                  </p:stCondLst>
+                                  <p:childTnLst>
+                                    <p:set>
+                                      <p:cBhvr>
+                                        <p:cTn id="27" dur="1" fill="hold">
+                                          <p:stCondLst>
+                                            <p:cond delay="0"/>
+                                          </p:stCondLst>
+                                        </p:cTn>
+                                        <p:tgtEl>
+                                          <p:spTgt spid="66"/>
+                                        </p:tgtEl>
+                                        <p:attrNameLst>
+                                          <p:attrName>style.visibility</p:attrName>
+                                        </p:attrNameLst>
+                                      </p:cBhvr>
+                                      <p:to>
+                                        <p:strVal val="visible"/>
+                                      </p:to>
+                                    </p:set>
+                                    <p:animEffect transition="in" filter="fade">
+                                      <p:cBhvr>
+                                        <p:cTn id="28" dur="1000"/>
+                                        <p:tgtEl>
+                                          <p:spTgt spid="66"/>
                                         </p:tgtEl>
                                       </p:cBhvr>
                                     </p:animEffect>

</xml_diff>